<commit_message>
added replacing of a slide in PPT with others
</commit_message>
<xml_diff>
--- a/spec/data/example_template.pptx
+++ b/spec/data/example_template.pptx
@@ -5,20 +5,21 @@
     <p:sldMasterId id="2147483648" r:id="rId1"/>
   </p:sldMasterIdLst>
   <p:notesMasterIdLst>
-    <p:notesMasterId r:id="rId5"/>
+    <p:notesMasterId r:id="rId6"/>
   </p:notesMasterIdLst>
   <p:handoutMasterIdLst>
-    <p:handoutMasterId r:id="rId6"/>
+    <p:handoutMasterId r:id="rId7"/>
   </p:handoutMasterIdLst>
   <p:sldIdLst>
     <p:sldId id="260" r:id="rId2"/>
     <p:sldId id="261" r:id="rId3"/>
-    <p:sldId id="266" r:id="rId4"/>
+    <p:sldId id="267" r:id="rId4"/>
+    <p:sldId id="266" r:id="rId5"/>
   </p:sldIdLst>
   <p:sldSz cx="8961438" cy="6721475"/>
   <p:notesSz cx="6743700" cy="9906000"/>
   <p:custDataLst>
-    <p:tags r:id="rId8"/>
+    <p:tags r:id="rId9"/>
   </p:custDataLst>
   <p:defaultTextStyle>
     <a:defPPr>
@@ -1121,7 +1122,7 @@
               <a:pPr>
                 <a:defRPr/>
               </a:pPr>
-              <a:t>2</a:t>
+              <a:t>3</a:t>
             </a:fld>
             <a:endParaRPr lang="en-US" dirty="0"/>
           </a:p>
@@ -2839,7 +2840,7 @@
           <a:graphicData uri="http://schemas.openxmlformats.org/presentationml/2006/ole">
             <mc:AlternateContent xmlns:mc="http://schemas.openxmlformats.org/markup-compatibility/2006">
               <mc:Choice xmlns:v="urn:schemas-microsoft-com:vml" Requires="v">
-                <p:oleObj spid="_x0000_s12345" name="think-cell Slide" r:id="rId8" imgW="270" imgH="270" progId="TCLayout.ActiveDocument.1">
+                <p:oleObj spid="_x0000_s12349" name="think-cell Slide" r:id="rId8" imgW="270" imgH="270" progId="TCLayout.ActiveDocument.1">
                   <p:embed/>
                 </p:oleObj>
               </mc:Choice>
@@ -5358,7 +5359,7 @@
           <a:graphicData uri="http://schemas.openxmlformats.org/presentationml/2006/ole">
             <mc:AlternateContent xmlns:mc="http://schemas.openxmlformats.org/markup-compatibility/2006">
               <mc:Choice xmlns:v="urn:schemas-microsoft-com:vml" Requires="v">
-                <p:oleObj spid="_x0000_s13360" name="think-cell Slide" r:id="rId5" imgW="270" imgH="270" progId="TCLayout.ActiveDocument.1">
+                <p:oleObj spid="_x0000_s13364" name="think-cell Slide" r:id="rId5" imgW="270" imgH="270" progId="TCLayout.ActiveDocument.1">
                   <p:embed/>
                 </p:oleObj>
               </mc:Choice>
@@ -5777,6 +5778,71 @@
           <a:chExt cx="0" cy="0"/>
         </a:xfrm>
       </p:grpSpPr>
+      <p:sp>
+        <p:nvSpPr>
+          <p:cNvPr id="2" name="Title 1"/>
+          <p:cNvSpPr>
+            <a:spLocks noGrp="1"/>
+          </p:cNvSpPr>
+          <p:nvPr>
+            <p:ph type="title"/>
+          </p:nvPr>
+        </p:nvSpPr>
+        <p:spPr/>
+        <p:txBody>
+          <a:bodyPr/>
+          <a:lstStyle/>
+          <a:p>
+            <a:r>
+              <a:rPr lang="en-US" dirty="0" smtClean="0"/>
+              <a:t>#</a:t>
+            </a:r>
+            <a:r>
+              <a:rPr lang="en-US" smtClean="0"/>
+              <a:t>replace_placeholder#</a:t>
+            </a:r>
+            <a:endParaRPr lang="en-US" dirty="0"/>
+          </a:p>
+        </p:txBody>
+      </p:sp>
+    </p:spTree>
+    <p:extLst>
+      <p:ext uri="{BB962C8B-B14F-4D97-AF65-F5344CB8AC3E}">
+        <p14:creationId xmlns:p14="http://schemas.microsoft.com/office/powerpoint/2010/main" val="370022747"/>
+      </p:ext>
+    </p:extLst>
+  </p:cSld>
+  <p:clrMapOvr>
+    <a:masterClrMapping/>
+  </p:clrMapOvr>
+  <mc:AlternateContent xmlns:mc="http://schemas.openxmlformats.org/markup-compatibility/2006">
+    <mc:Choice xmlns:p14="http://schemas.microsoft.com/office/powerpoint/2010/main" Requires="p14">
+      <p:transition spd="slow" p14:dur="2000"/>
+    </mc:Choice>
+    <mc:Fallback>
+      <p:transition xmlns:p14="http://schemas.microsoft.com/office/powerpoint/2010/main" spd="slow"/>
+    </mc:Fallback>
+  </mc:AlternateContent>
+</p:sld>
+</file>
+
+<file path=ppt/slides/slide4.xml><?xml version="1.0" encoding="utf-8"?>
+<p:sld xmlns:a="http://schemas.openxmlformats.org/drawingml/2006/main" xmlns:r="http://schemas.openxmlformats.org/officeDocument/2006/relationships" xmlns:p="http://schemas.openxmlformats.org/presentationml/2006/main">
+  <p:cSld>
+    <p:spTree>
+      <p:nvGrpSpPr>
+        <p:cNvPr id="1" name=""/>
+        <p:cNvGrpSpPr/>
+        <p:nvPr/>
+      </p:nvGrpSpPr>
+      <p:grpSpPr>
+        <a:xfrm>
+          <a:off x="0" y="0"/>
+          <a:ext cx="0" cy="0"/>
+          <a:chOff x="0" y="0"/>
+          <a:chExt cx="0" cy="0"/>
+        </a:xfrm>
+      </p:grpSpPr>
       <p:graphicFrame>
         <p:nvGraphicFramePr>
           <p:cNvPr id="4" name="Object 3" hidden="1"/>
@@ -5802,7 +5868,7 @@
           <a:graphicData uri="http://schemas.openxmlformats.org/presentationml/2006/ole">
             <mc:AlternateContent xmlns:mc="http://schemas.openxmlformats.org/markup-compatibility/2006">
               <mc:Choice xmlns:v="urn:schemas-microsoft-com:vml" Requires="v">
-                <p:oleObj spid="_x0000_s14378" name="think-cell Slide" r:id="rId12" imgW="500" imgH="417" progId="TCLayout.ActiveDocument.1">
+                <p:oleObj spid="_x0000_s14382" name="think-cell Slide" r:id="rId12" imgW="500" imgH="417" progId="TCLayout.ActiveDocument.1">
                   <p:embed/>
                 </p:oleObj>
               </mc:Choice>

</xml_diff>